<commit_message>
final commit finished and cleaned up 2
</commit_message>
<xml_diff>
--- a/presentation_and_summary/presentation.pptx
+++ b/presentation_and_summary/presentation.pptx
@@ -7288,7 +7288,7 @@
         </p:spPr>
         <p:txBody>
           <a:bodyPr>
-            <a:normAutofit fontScale="85000" lnSpcReduction="10000"/>
+            <a:normAutofit fontScale="92500" lnSpcReduction="10000"/>
           </a:bodyPr>
           <a:lstStyle/>
           <a:p>
@@ -7307,7 +7307,7 @@
             </a:pPr>
             <a:r>
               <a:rPr lang="en-GB" dirty="0"/>
-              <a:t>1. Weather Conditions have an effect on Flight Cancellations Across UK Airports</a:t>
+              <a:t>Weather Conditions have an effect on Flight Cancellations Across UK Airports</a:t>
             </a:r>
           </a:p>
           <a:p>
@@ -7324,7 +7324,7 @@
             </a:pPr>
             <a:r>
               <a:rPr lang="en-GB" dirty="0"/>
-              <a:t>2. Weather Conditions have an effect on Flight Delays Across UK Airports</a:t>
+              <a:t>Weather Conditions have an effect on Flight Delays Across UK Airports</a:t>
             </a:r>
           </a:p>
           <a:p>
@@ -7339,16 +7339,9 @@
               <a:buFont typeface="Arial" panose="020B0604020202020204" pitchFamily="34" charset="0"/>
               <a:buChar char="•"/>
             </a:pPr>
-            <a:endParaRPr lang="en-GB" dirty="0"/>
-          </a:p>
-          <a:p>
-            <a:pPr marL="342900" indent="-342900" algn="l">
-              <a:buFont typeface="Arial" panose="020B0604020202020204" pitchFamily="34" charset="0"/>
-              <a:buChar char="•"/>
-            </a:pPr>
             <a:r>
               <a:rPr lang="en-GB" dirty="0"/>
-              <a:t>3. Season Extremes have an effect on Flight Cancellations at Selected UK Airports</a:t>
+              <a:t>Season Extremes have an effect on Flight Cancellations at Selected UK Airports</a:t>
             </a:r>
           </a:p>
           <a:p>
@@ -7364,8 +7357,12 @@
               <a:buChar char="•"/>
             </a:pPr>
             <a:r>
+              <a:rPr lang="en-GB"/>
+              <a:t>Season </a:t>
+            </a:r>
+            <a:r>
               <a:rPr lang="en-GB" dirty="0"/>
-              <a:t>4. Season Extremes have an effect on Flight Delays at Selected UK Airports</a:t>
+              <a:t>Extremes have an effect on Flight Delays at Selected UK Airports</a:t>
             </a:r>
           </a:p>
           <a:p>
@@ -7517,7 +7514,7 @@
                                         <p:tgtEl>
                                           <p:spTgt spid="6">
                                             <p:txEl>
-                                              <p:pRg st="7" end="7"/>
+                                              <p:pRg st="6" end="6"/>
                                             </p:txEl>
                                           </p:spTgt>
                                         </p:tgtEl>
@@ -7566,7 +7563,7 @@
                                         <p:tgtEl>
                                           <p:spTgt spid="6">
                                             <p:txEl>
-                                              <p:pRg st="9" end="9"/>
+                                              <p:pRg st="8" end="8"/>
                                             </p:txEl>
                                           </p:spTgt>
                                         </p:tgtEl>

</xml_diff>